<commit_message>
I think I fixed the silhouette function. It (mostly) passed my initial set of tests. It had some trouble with castle, but was successfull on the rest.
</commit_message>
<xml_diff>
--- a/TVGLTest/Silhouette Tests/Silhouette Tests.pptx
+++ b/TVGLTest/Silhouette Tests/Silhouette Tests.pptx
@@ -6,11 +6,11 @@
   </p:sldMasterIdLst>
   <p:sldIdLst>
     <p:sldId id="256" r:id="rId2"/>
-    <p:sldId id="258" r:id="rId3"/>
-    <p:sldId id="260" r:id="rId4"/>
-    <p:sldId id="265" r:id="rId5"/>
-    <p:sldId id="261" r:id="rId6"/>
-    <p:sldId id="262" r:id="rId7"/>
+    <p:sldId id="260" r:id="rId3"/>
+    <p:sldId id="265" r:id="rId4"/>
+    <p:sldId id="261" r:id="rId5"/>
+    <p:sldId id="262" r:id="rId6"/>
+    <p:sldId id="266" r:id="rId7"/>
     <p:sldId id="259" r:id="rId8"/>
     <p:sldId id="263" r:id="rId9"/>
     <p:sldId id="264" r:id="rId10"/>
@@ -112,6 +112,11 @@
       </a:defRPr>
     </a:lvl9pPr>
   </p:defaultTextStyle>
+  <p:extLst>
+    <p:ext uri="{EFAFB233-063F-42B5-8137-9DF3F51BA10A}">
+      <p15:sldGuideLst xmlns:p15="http://schemas.microsoft.com/office/powerpoint/2012/main"/>
+    </p:ext>
+  </p:extLst>
 </p:presentation>
 </file>
 
@@ -246,7 +251,7 @@
           <a:p>
             <a:fld id="{4DEBB705-B24A-4D5B-A57C-42EB2ECBFFFC}" type="datetimeFigureOut">
               <a:rPr lang="en-US" smtClean="0"/>
-              <a:t>5/31/2018</a:t>
+              <a:t>6/2/2018</a:t>
             </a:fld>
             <a:endParaRPr lang="en-US"/>
           </a:p>
@@ -416,7 +421,7 @@
           <a:p>
             <a:fld id="{4DEBB705-B24A-4D5B-A57C-42EB2ECBFFFC}" type="datetimeFigureOut">
               <a:rPr lang="en-US" smtClean="0"/>
-              <a:t>5/31/2018</a:t>
+              <a:t>6/2/2018</a:t>
             </a:fld>
             <a:endParaRPr lang="en-US"/>
           </a:p>
@@ -596,7 +601,7 @@
           <a:p>
             <a:fld id="{4DEBB705-B24A-4D5B-A57C-42EB2ECBFFFC}" type="datetimeFigureOut">
               <a:rPr lang="en-US" smtClean="0"/>
-              <a:t>5/31/2018</a:t>
+              <a:t>6/2/2018</a:t>
             </a:fld>
             <a:endParaRPr lang="en-US"/>
           </a:p>
@@ -766,7 +771,7 @@
           <a:p>
             <a:fld id="{4DEBB705-B24A-4D5B-A57C-42EB2ECBFFFC}" type="datetimeFigureOut">
               <a:rPr lang="en-US" smtClean="0"/>
-              <a:t>5/31/2018</a:t>
+              <a:t>6/2/2018</a:t>
             </a:fld>
             <a:endParaRPr lang="en-US"/>
           </a:p>
@@ -1012,7 +1017,7 @@
           <a:p>
             <a:fld id="{4DEBB705-B24A-4D5B-A57C-42EB2ECBFFFC}" type="datetimeFigureOut">
               <a:rPr lang="en-US" smtClean="0"/>
-              <a:t>5/31/2018</a:t>
+              <a:t>6/2/2018</a:t>
             </a:fld>
             <a:endParaRPr lang="en-US"/>
           </a:p>
@@ -1244,7 +1249,7 @@
           <a:p>
             <a:fld id="{4DEBB705-B24A-4D5B-A57C-42EB2ECBFFFC}" type="datetimeFigureOut">
               <a:rPr lang="en-US" smtClean="0"/>
-              <a:t>5/31/2018</a:t>
+              <a:t>6/2/2018</a:t>
             </a:fld>
             <a:endParaRPr lang="en-US"/>
           </a:p>
@@ -1611,7 +1616,7 @@
           <a:p>
             <a:fld id="{4DEBB705-B24A-4D5B-A57C-42EB2ECBFFFC}" type="datetimeFigureOut">
               <a:rPr lang="en-US" smtClean="0"/>
-              <a:t>5/31/2018</a:t>
+              <a:t>6/2/2018</a:t>
             </a:fld>
             <a:endParaRPr lang="en-US"/>
           </a:p>
@@ -1729,7 +1734,7 @@
           <a:p>
             <a:fld id="{4DEBB705-B24A-4D5B-A57C-42EB2ECBFFFC}" type="datetimeFigureOut">
               <a:rPr lang="en-US" smtClean="0"/>
-              <a:t>5/31/2018</a:t>
+              <a:t>6/2/2018</a:t>
             </a:fld>
             <a:endParaRPr lang="en-US"/>
           </a:p>
@@ -1824,7 +1829,7 @@
           <a:p>
             <a:fld id="{4DEBB705-B24A-4D5B-A57C-42EB2ECBFFFC}" type="datetimeFigureOut">
               <a:rPr lang="en-US" smtClean="0"/>
-              <a:t>5/31/2018</a:t>
+              <a:t>6/2/2018</a:t>
             </a:fld>
             <a:endParaRPr lang="en-US"/>
           </a:p>
@@ -2101,7 +2106,7 @@
           <a:p>
             <a:fld id="{4DEBB705-B24A-4D5B-A57C-42EB2ECBFFFC}" type="datetimeFigureOut">
               <a:rPr lang="en-US" smtClean="0"/>
-              <a:t>5/31/2018</a:t>
+              <a:t>6/2/2018</a:t>
             </a:fld>
             <a:endParaRPr lang="en-US"/>
           </a:p>
@@ -2354,7 +2359,7 @@
           <a:p>
             <a:fld id="{4DEBB705-B24A-4D5B-A57C-42EB2ECBFFFC}" type="datetimeFigureOut">
               <a:rPr lang="en-US" smtClean="0"/>
-              <a:t>5/31/2018</a:t>
+              <a:t>6/2/2018</a:t>
             </a:fld>
             <a:endParaRPr lang="en-US"/>
           </a:p>
@@ -2567,7 +2572,7 @@
           <a:p>
             <a:fld id="{4DEBB705-B24A-4D5B-A57C-42EB2ECBFFFC}" type="datetimeFigureOut">
               <a:rPr lang="en-US" smtClean="0"/>
-              <a:t>5/31/2018</a:t>
+              <a:t>6/2/2018</a:t>
             </a:fld>
             <a:endParaRPr lang="en-US"/>
           </a:p>
@@ -3082,11 +3087,13 @@
       </p:grpSpPr>
       <p:pic>
         <p:nvPicPr>
-          <p:cNvPr id="22" name="Picture 21"/>
+          <p:cNvPr id="4" name="Content Placeholder 3"/>
           <p:cNvPicPr>
-            <a:picLocks noChangeAspect="1"/>
+            <a:picLocks noGrp="1" noChangeAspect="1"/>
           </p:cNvPicPr>
-          <p:nvPr/>
+          <p:nvPr>
+            <p:ph idx="1"/>
+          </p:nvPr>
         </p:nvPicPr>
         <p:blipFill>
           <a:blip r:embed="rId2"/>
@@ -3096,8 +3103,8 @@
         </p:blipFill>
         <p:spPr>
           <a:xfrm rot="5400000">
-            <a:off x="9144938" y="1022713"/>
-            <a:ext cx="3384357" cy="2122394"/>
+            <a:off x="5379368" y="1531561"/>
+            <a:ext cx="5876925" cy="4105275"/>
           </a:xfrm>
           <a:prstGeom prst="rect">
             <a:avLst/>
@@ -3106,7 +3113,7 @@
       </p:pic>
       <p:pic>
         <p:nvPicPr>
-          <p:cNvPr id="4" name="Picture 3"/>
+          <p:cNvPr id="5" name="Picture 4"/>
           <p:cNvPicPr>
             <a:picLocks noChangeAspect="1"/>
           </p:cNvPicPr>
@@ -3119,18 +3126,71 @@
           </a:stretch>
         </p:blipFill>
         <p:spPr>
-          <a:xfrm rot="5400000">
-            <a:off x="-665039" y="981870"/>
-            <a:ext cx="6518943" cy="4555204"/>
+          <a:xfrm>
+            <a:off x="1662112" y="531435"/>
+            <a:ext cx="4295775" cy="6105525"/>
           </a:xfrm>
           <a:prstGeom prst="rect">
             <a:avLst/>
           </a:prstGeom>
         </p:spPr>
       </p:pic>
+      <p:sp>
+        <p:nvSpPr>
+          <p:cNvPr id="6" name="Rectangle 5"/>
+          <p:cNvSpPr/>
+          <p:nvPr/>
+        </p:nvSpPr>
+        <p:spPr>
+          <a:xfrm>
+            <a:off x="0" y="6488668"/>
+            <a:ext cx="4688463" cy="369332"/>
+          </a:xfrm>
+          <a:prstGeom prst="rect">
+            <a:avLst/>
+          </a:prstGeom>
+        </p:spPr>
+        <p:txBody>
+          <a:bodyPr wrap="none">
+            <a:spAutoFit/>
+          </a:bodyPr>
+          <a:lstStyle/>
+          <a:p>
+            <a:r>
+              <a:rPr lang="en-US" dirty="0" smtClean="0"/>
+              <a:t>Casing, </a:t>
+            </a:r>
+            <a:r>
+              <a:rPr lang="en-US" dirty="0" err="1"/>
+              <a:t>minAngle</a:t>
+            </a:r>
+            <a:r>
+              <a:rPr lang="en-US" dirty="0"/>
+              <a:t> = </a:t>
+            </a:r>
+            <a:r>
+              <a:rPr lang="en-US" dirty="0" smtClean="0"/>
+              <a:t>0.1, </a:t>
+            </a:r>
+            <a:r>
+              <a:rPr lang="en-US" dirty="0" smtClean="0"/>
+              <a:t>Normal = [0.2</a:t>
+            </a:r>
+            <a:r>
+              <a:rPr lang="en-US" dirty="0" smtClean="0"/>
+              <a:t>, 0.0, 0.8</a:t>
+            </a:r>
+            <a:r>
+              <a:rPr lang="en-US" dirty="0" smtClean="0"/>
+              <a:t>] </a:t>
+            </a:r>
+            <a:endParaRPr lang="en-US" dirty="0"/>
+          </a:p>
+        </p:txBody>
+      </p:sp>
       <p:pic>
         <p:nvPicPr>
-          <p:cNvPr id="5" name="Picture 4"/>
+          <p:cNvPr id="8" name="Picture 7"/>
           <p:cNvPicPr>
             <a:picLocks noChangeAspect="1"/>
           </p:cNvPicPr>
@@ -3143,432 +3203,19 @@
           </a:stretch>
         </p:blipFill>
         <p:spPr>
-          <a:xfrm rot="5400000">
-            <a:off x="4246590" y="1371958"/>
-            <a:ext cx="6795833" cy="4024605"/>
+          <a:xfrm>
+            <a:off x="181277" y="144379"/>
+            <a:ext cx="2352724" cy="2911642"/>
           </a:xfrm>
           <a:prstGeom prst="rect">
             <a:avLst/>
           </a:prstGeom>
         </p:spPr>
       </p:pic>
-      <p:cxnSp>
-        <p:nvCxnSpPr>
-          <p:cNvPr id="7" name="Straight Arrow Connector 6"/>
-          <p:cNvCxnSpPr/>
-          <p:nvPr/>
-        </p:nvCxnSpPr>
-        <p:spPr>
-          <a:xfrm flipV="1">
-            <a:off x="5104020" y="3593432"/>
-            <a:ext cx="409073" cy="8021"/>
-          </a:xfrm>
-          <a:prstGeom prst="straightConnector1">
-            <a:avLst/>
-          </a:prstGeom>
-          <a:ln w="57150">
-            <a:solidFill>
-              <a:schemeClr val="accent1"/>
-            </a:solidFill>
-            <a:tailEnd type="triangle"/>
-          </a:ln>
-        </p:spPr>
-        <p:style>
-          <a:lnRef idx="1">
-            <a:schemeClr val="accent1"/>
-          </a:lnRef>
-          <a:fillRef idx="0">
-            <a:schemeClr val="accent1"/>
-          </a:fillRef>
-          <a:effectRef idx="0">
-            <a:schemeClr val="accent1"/>
-          </a:effectRef>
-          <a:fontRef idx="minor">
-            <a:schemeClr val="tx1"/>
-          </a:fontRef>
-        </p:style>
-      </p:cxnSp>
-      <p:sp>
-        <p:nvSpPr>
-          <p:cNvPr id="8" name="TextBox 7"/>
-          <p:cNvSpPr txBox="1"/>
-          <p:nvPr/>
-        </p:nvSpPr>
-        <p:spPr>
-          <a:xfrm>
-            <a:off x="4710859" y="2605933"/>
-            <a:ext cx="1177844" cy="923330"/>
-          </a:xfrm>
-          <a:prstGeom prst="rect">
-            <a:avLst/>
-          </a:prstGeom>
-          <a:noFill/>
-        </p:spPr>
-        <p:txBody>
-          <a:bodyPr wrap="square" rtlCol="0">
-            <a:spAutoFit/>
-          </a:bodyPr>
-          <a:lstStyle/>
-          <a:p>
-            <a:pPr algn="ctr"/>
-            <a:r>
-              <a:rPr lang="en-US" dirty="0" smtClean="0"/>
-              <a:t>Union Positive Fill</a:t>
-            </a:r>
-            <a:endParaRPr lang="en-US" dirty="0"/>
-          </a:p>
-        </p:txBody>
-      </p:sp>
-      <p:cxnSp>
-        <p:nvCxnSpPr>
-          <p:cNvPr id="10" name="Straight Arrow Connector 9"/>
-          <p:cNvCxnSpPr/>
-          <p:nvPr/>
-        </p:nvCxnSpPr>
-        <p:spPr>
-          <a:xfrm flipH="1">
-            <a:off x="7813528" y="4181474"/>
-            <a:ext cx="2012303" cy="109789"/>
-          </a:xfrm>
-          <a:prstGeom prst="straightConnector1">
-            <a:avLst/>
-          </a:prstGeom>
-          <a:ln>
-            <a:tailEnd type="triangle"/>
-          </a:ln>
-        </p:spPr>
-        <p:style>
-          <a:lnRef idx="1">
-            <a:schemeClr val="accent1"/>
-          </a:lnRef>
-          <a:fillRef idx="0">
-            <a:schemeClr val="accent1"/>
-          </a:fillRef>
-          <a:effectRef idx="0">
-            <a:schemeClr val="accent1"/>
-          </a:effectRef>
-          <a:fontRef idx="minor">
-            <a:schemeClr val="tx1"/>
-          </a:fontRef>
-        </p:style>
-      </p:cxnSp>
-      <p:cxnSp>
-        <p:nvCxnSpPr>
-          <p:cNvPr id="11" name="Straight Arrow Connector 10"/>
-          <p:cNvCxnSpPr/>
-          <p:nvPr/>
-        </p:nvCxnSpPr>
-        <p:spPr>
-          <a:xfrm flipH="1">
-            <a:off x="6802875" y="4181474"/>
-            <a:ext cx="3022956" cy="1681915"/>
-          </a:xfrm>
-          <a:prstGeom prst="straightConnector1">
-            <a:avLst/>
-          </a:prstGeom>
-          <a:ln>
-            <a:tailEnd type="triangle"/>
-          </a:ln>
-        </p:spPr>
-        <p:style>
-          <a:lnRef idx="1">
-            <a:schemeClr val="accent1"/>
-          </a:lnRef>
-          <a:fillRef idx="0">
-            <a:schemeClr val="accent1"/>
-          </a:fillRef>
-          <a:effectRef idx="0">
-            <a:schemeClr val="accent1"/>
-          </a:effectRef>
-          <a:fontRef idx="minor">
-            <a:schemeClr val="tx1"/>
-          </a:fontRef>
-        </p:style>
-      </p:cxnSp>
-      <p:cxnSp>
-        <p:nvCxnSpPr>
-          <p:cNvPr id="12" name="Straight Arrow Connector 11"/>
-          <p:cNvCxnSpPr/>
-          <p:nvPr/>
-        </p:nvCxnSpPr>
-        <p:spPr>
-          <a:xfrm flipH="1" flipV="1">
-            <a:off x="9096897" y="4071685"/>
-            <a:ext cx="728934" cy="109789"/>
-          </a:xfrm>
-          <a:prstGeom prst="straightConnector1">
-            <a:avLst/>
-          </a:prstGeom>
-          <a:ln>
-            <a:tailEnd type="triangle"/>
-          </a:ln>
-        </p:spPr>
-        <p:style>
-          <a:lnRef idx="1">
-            <a:schemeClr val="accent1"/>
-          </a:lnRef>
-          <a:fillRef idx="0">
-            <a:schemeClr val="accent1"/>
-          </a:fillRef>
-          <a:effectRef idx="0">
-            <a:schemeClr val="accent1"/>
-          </a:effectRef>
-          <a:fontRef idx="minor">
-            <a:schemeClr val="tx1"/>
-          </a:fontRef>
-        </p:style>
-      </p:cxnSp>
-      <p:sp>
-        <p:nvSpPr>
-          <p:cNvPr id="17" name="TextBox 16"/>
-          <p:cNvSpPr txBox="1"/>
-          <p:nvPr/>
-        </p:nvSpPr>
-        <p:spPr>
-          <a:xfrm>
-            <a:off x="9825831" y="3996808"/>
-            <a:ext cx="1520160" cy="369332"/>
-          </a:xfrm>
-          <a:prstGeom prst="rect">
-            <a:avLst/>
-          </a:prstGeom>
-          <a:noFill/>
-        </p:spPr>
-        <p:txBody>
-          <a:bodyPr wrap="none" rtlCol="0">
-            <a:spAutoFit/>
-          </a:bodyPr>
-          <a:lstStyle/>
-          <a:p>
-            <a:r>
-              <a:rPr lang="en-US" dirty="0" smtClean="0"/>
-              <a:t>Possible Holes</a:t>
-            </a:r>
-            <a:endParaRPr lang="en-US" dirty="0"/>
-          </a:p>
-        </p:txBody>
-      </p:sp>
-      <p:cxnSp>
-        <p:nvCxnSpPr>
-          <p:cNvPr id="19" name="Straight Arrow Connector 18"/>
-          <p:cNvCxnSpPr/>
-          <p:nvPr/>
-        </p:nvCxnSpPr>
-        <p:spPr>
-          <a:xfrm flipV="1">
-            <a:off x="9247736" y="2783305"/>
-            <a:ext cx="754517" cy="216570"/>
-          </a:xfrm>
-          <a:prstGeom prst="straightConnector1">
-            <a:avLst/>
-          </a:prstGeom>
-          <a:ln w="57150">
-            <a:solidFill>
-              <a:schemeClr val="accent1"/>
-            </a:solidFill>
-            <a:tailEnd type="triangle"/>
-          </a:ln>
-        </p:spPr>
-        <p:style>
-          <a:lnRef idx="1">
-            <a:schemeClr val="accent1"/>
-          </a:lnRef>
-          <a:fillRef idx="0">
-            <a:schemeClr val="accent1"/>
-          </a:fillRef>
-          <a:effectRef idx="0">
-            <a:schemeClr val="accent1"/>
-          </a:effectRef>
-          <a:fontRef idx="minor">
-            <a:schemeClr val="tx1"/>
-          </a:fontRef>
-        </p:style>
-      </p:cxnSp>
-      <p:sp>
-        <p:nvSpPr>
-          <p:cNvPr id="21" name="TextBox 20"/>
-          <p:cNvSpPr txBox="1"/>
-          <p:nvPr/>
-        </p:nvSpPr>
-        <p:spPr>
-          <a:xfrm>
-            <a:off x="9370595" y="1864517"/>
-            <a:ext cx="1690438" cy="923330"/>
-          </a:xfrm>
-          <a:prstGeom prst="rect">
-            <a:avLst/>
-          </a:prstGeom>
-          <a:noFill/>
-        </p:spPr>
-        <p:txBody>
-          <a:bodyPr wrap="square" rtlCol="0">
-            <a:spAutoFit/>
-          </a:bodyPr>
-          <a:lstStyle/>
-          <a:p>
-            <a:r>
-              <a:rPr lang="en-US" dirty="0" smtClean="0"/>
-              <a:t>Hole vs. Overhang Check</a:t>
-            </a:r>
-            <a:endParaRPr lang="en-US" dirty="0"/>
-          </a:p>
-        </p:txBody>
-      </p:sp>
-      <p:cxnSp>
-        <p:nvCxnSpPr>
-          <p:cNvPr id="24" name="Straight Arrow Connector 23"/>
-          <p:cNvCxnSpPr/>
-          <p:nvPr/>
-        </p:nvCxnSpPr>
-        <p:spPr>
-          <a:xfrm>
-            <a:off x="10098507" y="489284"/>
-            <a:ext cx="208546" cy="2894976"/>
-          </a:xfrm>
-          <a:prstGeom prst="straightConnector1">
-            <a:avLst/>
-          </a:prstGeom>
-          <a:ln>
-            <a:tailEnd type="triangle"/>
-          </a:ln>
-        </p:spPr>
-        <p:style>
-          <a:lnRef idx="1">
-            <a:schemeClr val="accent1"/>
-          </a:lnRef>
-          <a:fillRef idx="0">
-            <a:schemeClr val="accent1"/>
-          </a:fillRef>
-          <a:effectRef idx="0">
-            <a:schemeClr val="accent1"/>
-          </a:effectRef>
-          <a:fontRef idx="minor">
-            <a:schemeClr val="tx1"/>
-          </a:fontRef>
-        </p:style>
-      </p:cxnSp>
-      <p:cxnSp>
-        <p:nvCxnSpPr>
-          <p:cNvPr id="25" name="Straight Arrow Connector 24"/>
-          <p:cNvCxnSpPr/>
-          <p:nvPr/>
-        </p:nvCxnSpPr>
-        <p:spPr>
-          <a:xfrm>
-            <a:off x="10090485" y="489284"/>
-            <a:ext cx="649704" cy="2010275"/>
-          </a:xfrm>
-          <a:prstGeom prst="straightConnector1">
-            <a:avLst/>
-          </a:prstGeom>
-          <a:ln>
-            <a:tailEnd type="triangle"/>
-          </a:ln>
-        </p:spPr>
-        <p:style>
-          <a:lnRef idx="1">
-            <a:schemeClr val="accent1"/>
-          </a:lnRef>
-          <a:fillRef idx="0">
-            <a:schemeClr val="accent1"/>
-          </a:fillRef>
-          <a:effectRef idx="0">
-            <a:schemeClr val="accent1"/>
-          </a:effectRef>
-          <a:fontRef idx="minor">
-            <a:schemeClr val="tx1"/>
-          </a:fontRef>
-        </p:style>
-      </p:cxnSp>
-      <p:sp>
-        <p:nvSpPr>
-          <p:cNvPr id="29" name="TextBox 28"/>
-          <p:cNvSpPr txBox="1"/>
-          <p:nvPr/>
-        </p:nvSpPr>
-        <p:spPr>
-          <a:xfrm>
-            <a:off x="9363266" y="207065"/>
-            <a:ext cx="1454437" cy="369332"/>
-          </a:xfrm>
-          <a:prstGeom prst="rect">
-            <a:avLst/>
-          </a:prstGeom>
-          <a:noFill/>
-        </p:spPr>
-        <p:txBody>
-          <a:bodyPr wrap="none" rtlCol="0">
-            <a:spAutoFit/>
-          </a:bodyPr>
-          <a:lstStyle/>
-          <a:p>
-            <a:r>
-              <a:rPr lang="en-US" dirty="0" smtClean="0"/>
-              <a:t>Correct Holes</a:t>
-            </a:r>
-            <a:endParaRPr lang="en-US" dirty="0"/>
-          </a:p>
-        </p:txBody>
-      </p:sp>
-      <p:pic>
-        <p:nvPicPr>
-          <p:cNvPr id="30" name="Content Placeholder 3"/>
-          <p:cNvPicPr>
-            <a:picLocks noGrp="1" noChangeAspect="1"/>
-          </p:cNvPicPr>
-          <p:nvPr>
-            <p:ph idx="1"/>
-          </p:nvPr>
-        </p:nvPicPr>
-        <p:blipFill>
-          <a:blip r:embed="rId5"/>
-          <a:stretch>
-            <a:fillRect/>
-          </a:stretch>
-        </p:blipFill>
-        <p:spPr>
-          <a:xfrm>
-            <a:off x="0" y="14923"/>
-            <a:ext cx="1507625" cy="1657452"/>
-          </a:xfrm>
-          <a:prstGeom prst="rect">
-            <a:avLst/>
-          </a:prstGeom>
-        </p:spPr>
-      </p:pic>
-      <p:sp>
-        <p:nvSpPr>
-          <p:cNvPr id="31" name="Rectangle 30"/>
-          <p:cNvSpPr/>
-          <p:nvPr/>
-        </p:nvSpPr>
-        <p:spPr>
-          <a:xfrm>
-            <a:off x="0" y="6488668"/>
-            <a:ext cx="1422184" cy="369332"/>
-          </a:xfrm>
-          <a:prstGeom prst="rect">
-            <a:avLst/>
-          </a:prstGeom>
-        </p:spPr>
-        <p:txBody>
-          <a:bodyPr wrap="none">
-            <a:spAutoFit/>
-          </a:bodyPr>
-          <a:lstStyle/>
-          <a:p>
-            <a:r>
-              <a:rPr lang="en-US" dirty="0" smtClean="0"/>
-              <a:t>[0.5, 0.0, 0.5]</a:t>
-            </a:r>
-            <a:endParaRPr lang="en-US" dirty="0"/>
-          </a:p>
-        </p:txBody>
-      </p:sp>
     </p:spTree>
     <p:extLst>
       <p:ext uri="{BB962C8B-B14F-4D97-AF65-F5344CB8AC3E}">
-        <p14:creationId xmlns:p14="http://schemas.microsoft.com/office/powerpoint/2010/main" val="56151536"/>
+        <p14:creationId xmlns:p14="http://schemas.microsoft.com/office/powerpoint/2010/main" val="2783495183"/>
       </p:ext>
     </p:extLst>
   </p:cSld>
@@ -3602,6 +3249,25 @@
           <a:chExt cx="0" cy="0"/>
         </a:xfrm>
       </p:grpSpPr>
+      <p:sp>
+        <p:nvSpPr>
+          <p:cNvPr id="2" name="Title 1"/>
+          <p:cNvSpPr>
+            <a:spLocks noGrp="1"/>
+          </p:cNvSpPr>
+          <p:nvPr>
+            <p:ph type="title"/>
+          </p:nvPr>
+        </p:nvSpPr>
+        <p:spPr/>
+        <p:txBody>
+          <a:bodyPr/>
+          <a:lstStyle/>
+          <a:p>
+            <a:endParaRPr lang="en-US"/>
+          </a:p>
+        </p:txBody>
+      </p:sp>
       <p:pic>
         <p:nvPicPr>
           <p:cNvPr id="4" name="Content Placeholder 3"/>
@@ -3620,8 +3286,8 @@
         </p:blipFill>
         <p:spPr>
           <a:xfrm rot="5400000">
-            <a:off x="5379368" y="1531561"/>
-            <a:ext cx="5876925" cy="4105275"/>
+            <a:off x="6565208" y="1315515"/>
+            <a:ext cx="4569829" cy="5320175"/>
           </a:xfrm>
           <a:prstGeom prst="rect">
             <a:avLst/>
@@ -3644,8 +3310,8 @@
         </p:blipFill>
         <p:spPr>
           <a:xfrm>
-            <a:off x="1662112" y="531435"/>
-            <a:ext cx="4295775" cy="6105525"/>
+            <a:off x="194137" y="1690688"/>
+            <a:ext cx="5901863" cy="4555909"/>
           </a:xfrm>
           <a:prstGeom prst="rect">
             <a:avLst/>
@@ -3660,55 +3326,65 @@
         </p:nvSpPr>
         <p:spPr>
           <a:xfrm>
-            <a:off x="0" y="6488668"/>
-            <a:ext cx="2142894" cy="369332"/>
+            <a:off x="-1" y="6488668"/>
+            <a:ext cx="6605337" cy="646331"/>
           </a:xfrm>
           <a:prstGeom prst="rect">
             <a:avLst/>
           </a:prstGeom>
         </p:spPr>
         <p:txBody>
-          <a:bodyPr wrap="none">
+          <a:bodyPr wrap="square">
             <a:spAutoFit/>
           </a:bodyPr>
           <a:lstStyle/>
           <a:p>
             <a:r>
               <a:rPr lang="en-US" dirty="0" smtClean="0"/>
-              <a:t>Casing, [0.2, 0.0, 0.8]</a:t>
+              <a:t>Casing</a:t>
+            </a:r>
+            <a:r>
+              <a:rPr lang="en-US" dirty="0" smtClean="0"/>
+              <a:t>, </a:t>
+            </a:r>
+            <a:r>
+              <a:rPr lang="en-US" dirty="0" err="1" smtClean="0">
+                <a:solidFill>
+                  <a:srgbClr val="000000"/>
+                </a:solidFill>
+                <a:latin typeface="Consolas" panose="020B0609020204030204" pitchFamily="49" charset="0"/>
+              </a:rPr>
+              <a:t>MinAngle</a:t>
+            </a:r>
+            <a:r>
+              <a:rPr lang="en-US" dirty="0" smtClean="0">
+                <a:solidFill>
+                  <a:srgbClr val="000000"/>
+                </a:solidFill>
+                <a:latin typeface="Consolas" panose="020B0609020204030204" pitchFamily="49" charset="0"/>
+              </a:rPr>
+              <a:t> </a:t>
+            </a:r>
+            <a:r>
+              <a:rPr lang="en-US" dirty="0">
+                <a:solidFill>
+                  <a:srgbClr val="000000"/>
+                </a:solidFill>
+                <a:latin typeface="Consolas" panose="020B0609020204030204" pitchFamily="49" charset="0"/>
+              </a:rPr>
+              <a:t>= 0.1, Normal = { 0.8, 0.1, 0.1 }</a:t>
             </a:r>
             <a:endParaRPr lang="en-US" dirty="0"/>
           </a:p>
-        </p:txBody>
-      </p:sp>
-      <p:pic>
-        <p:nvPicPr>
-          <p:cNvPr id="8" name="Picture 7"/>
-          <p:cNvPicPr>
-            <a:picLocks noChangeAspect="1"/>
-          </p:cNvPicPr>
-          <p:nvPr/>
-        </p:nvPicPr>
-        <p:blipFill>
-          <a:blip r:embed="rId4"/>
-          <a:stretch>
-            <a:fillRect/>
-          </a:stretch>
-        </p:blipFill>
-        <p:spPr>
-          <a:xfrm>
-            <a:off x="181277" y="144379"/>
-            <a:ext cx="2352724" cy="2911642"/>
-          </a:xfrm>
-          <a:prstGeom prst="rect">
-            <a:avLst/>
-          </a:prstGeom>
-        </p:spPr>
-      </p:pic>
+          <a:p>
+            <a:endParaRPr lang="en-US" dirty="0"/>
+          </a:p>
+        </p:txBody>
+      </p:sp>
     </p:spTree>
     <p:extLst>
       <p:ext uri="{BB962C8B-B14F-4D97-AF65-F5344CB8AC3E}">
-        <p14:creationId xmlns:p14="http://schemas.microsoft.com/office/powerpoint/2010/main" val="2783495183"/>
+        <p14:creationId xmlns:p14="http://schemas.microsoft.com/office/powerpoint/2010/main" val="4192551034"/>
       </p:ext>
     </p:extLst>
   </p:cSld>
@@ -3757,19 +3433,36 @@
           <a:bodyPr/>
           <a:lstStyle/>
           <a:p>
-            <a:endParaRPr lang="en-US"/>
+            <a:endParaRPr lang="en-US" dirty="0"/>
+          </a:p>
+        </p:txBody>
+      </p:sp>
+      <p:sp>
+        <p:nvSpPr>
+          <p:cNvPr id="3" name="Content Placeholder 2"/>
+          <p:cNvSpPr>
+            <a:spLocks noGrp="1"/>
+          </p:cNvSpPr>
+          <p:nvPr>
+            <p:ph idx="1"/>
+          </p:nvPr>
+        </p:nvSpPr>
+        <p:spPr/>
+        <p:txBody>
+          <a:bodyPr/>
+          <a:lstStyle/>
+          <a:p>
+            <a:endParaRPr lang="en-US" dirty="0"/>
           </a:p>
         </p:txBody>
       </p:sp>
       <p:pic>
         <p:nvPicPr>
-          <p:cNvPr id="4" name="Content Placeholder 3"/>
+          <p:cNvPr id="4" name="Picture 3"/>
           <p:cNvPicPr>
-            <a:picLocks noGrp="1" noChangeAspect="1"/>
+            <a:picLocks noChangeAspect="1"/>
           </p:cNvPicPr>
-          <p:nvPr>
-            <p:ph idx="1"/>
-          </p:nvPr>
+          <p:nvPr/>
         </p:nvPicPr>
         <p:blipFill>
           <a:blip r:embed="rId2"/>
@@ -3778,18 +3471,47 @@
           </a:stretch>
         </p:blipFill>
         <p:spPr>
-          <a:xfrm rot="5400000">
-            <a:off x="6565208" y="1315515"/>
-            <a:ext cx="4569829" cy="5320175"/>
+          <a:xfrm rot="16200000">
+            <a:off x="6618736" y="2046565"/>
+            <a:ext cx="3979197" cy="4086225"/>
           </a:xfrm>
           <a:prstGeom prst="rect">
             <a:avLst/>
           </a:prstGeom>
         </p:spPr>
       </p:pic>
+      <p:sp>
+        <p:nvSpPr>
+          <p:cNvPr id="5" name="Rectangle 4"/>
+          <p:cNvSpPr/>
+          <p:nvPr/>
+        </p:nvSpPr>
+        <p:spPr>
+          <a:xfrm>
+            <a:off x="0" y="6488668"/>
+            <a:ext cx="1422184" cy="369332"/>
+          </a:xfrm>
+          <a:prstGeom prst="rect">
+            <a:avLst/>
+          </a:prstGeom>
+        </p:spPr>
+        <p:txBody>
+          <a:bodyPr wrap="none">
+            <a:spAutoFit/>
+          </a:bodyPr>
+          <a:lstStyle/>
+          <a:p>
+            <a:r>
+              <a:rPr lang="en-US" dirty="0" smtClean="0"/>
+              <a:t>[0.2, 0.0, 0.8]</a:t>
+            </a:r>
+            <a:endParaRPr lang="en-US" dirty="0"/>
+          </a:p>
+        </p:txBody>
+      </p:sp>
       <p:pic>
         <p:nvPicPr>
-          <p:cNvPr id="5" name="Picture 4"/>
+          <p:cNvPr id="7" name="Picture 6"/>
           <p:cNvPicPr>
             <a:picLocks noChangeAspect="1"/>
           </p:cNvPicPr>
@@ -3803,8 +3525,8 @@
         </p:blipFill>
         <p:spPr>
           <a:xfrm>
-            <a:off x="194137" y="1690688"/>
-            <a:ext cx="5901863" cy="4555909"/>
+            <a:off x="1269784" y="2318028"/>
+            <a:ext cx="4467225" cy="3543300"/>
           </a:xfrm>
           <a:prstGeom prst="rect">
             <a:avLst/>
@@ -3814,7 +3536,7 @@
     </p:spTree>
     <p:extLst>
       <p:ext uri="{BB962C8B-B14F-4D97-AF65-F5344CB8AC3E}">
-        <p14:creationId xmlns:p14="http://schemas.microsoft.com/office/powerpoint/2010/main" val="4192551034"/>
+        <p14:creationId xmlns:p14="http://schemas.microsoft.com/office/powerpoint/2010/main" val="3357732664"/>
       </p:ext>
     </p:extLst>
   </p:cSld>
@@ -3863,36 +3585,19 @@
           <a:bodyPr/>
           <a:lstStyle/>
           <a:p>
-            <a:endParaRPr lang="en-US" dirty="0"/>
-          </a:p>
-        </p:txBody>
-      </p:sp>
-      <p:sp>
-        <p:nvSpPr>
-          <p:cNvPr id="3" name="Content Placeholder 2"/>
-          <p:cNvSpPr>
-            <a:spLocks noGrp="1"/>
-          </p:cNvSpPr>
-          <p:nvPr>
-            <p:ph idx="1"/>
-          </p:nvPr>
-        </p:nvSpPr>
-        <p:spPr/>
-        <p:txBody>
-          <a:bodyPr/>
-          <a:lstStyle/>
-          <a:p>
-            <a:endParaRPr lang="en-US" dirty="0"/>
+            <a:endParaRPr lang="en-US"/>
           </a:p>
         </p:txBody>
       </p:sp>
       <p:pic>
         <p:nvPicPr>
-          <p:cNvPr id="4" name="Picture 3"/>
+          <p:cNvPr id="4" name="Content Placeholder 3"/>
           <p:cNvPicPr>
-            <a:picLocks noChangeAspect="1"/>
+            <a:picLocks noGrp="1" noChangeAspect="1"/>
           </p:cNvPicPr>
-          <p:nvPr/>
+          <p:nvPr>
+            <p:ph idx="1"/>
+          </p:nvPr>
         </p:nvPicPr>
         <p:blipFill>
           <a:blip r:embed="rId2"/>
@@ -3901,47 +3606,18 @@
           </a:stretch>
         </p:blipFill>
         <p:spPr>
-          <a:xfrm rot="16200000">
-            <a:off x="6618736" y="2046565"/>
-            <a:ext cx="3979197" cy="4086225"/>
+          <a:xfrm>
+            <a:off x="5381625" y="2034131"/>
+            <a:ext cx="5972175" cy="4191000"/>
           </a:xfrm>
           <a:prstGeom prst="rect">
             <a:avLst/>
           </a:prstGeom>
         </p:spPr>
       </p:pic>
-      <p:sp>
-        <p:nvSpPr>
-          <p:cNvPr id="5" name="Rectangle 4"/>
-          <p:cNvSpPr/>
-          <p:nvPr/>
-        </p:nvSpPr>
-        <p:spPr>
-          <a:xfrm>
-            <a:off x="0" y="6488668"/>
-            <a:ext cx="1422184" cy="369332"/>
-          </a:xfrm>
-          <a:prstGeom prst="rect">
-            <a:avLst/>
-          </a:prstGeom>
-        </p:spPr>
-        <p:txBody>
-          <a:bodyPr wrap="none">
-            <a:spAutoFit/>
-          </a:bodyPr>
-          <a:lstStyle/>
-          <a:p>
-            <a:r>
-              <a:rPr lang="en-US" dirty="0" smtClean="0"/>
-              <a:t>[0.2, 0.0, 0.8]</a:t>
-            </a:r>
-            <a:endParaRPr lang="en-US" dirty="0"/>
-          </a:p>
-        </p:txBody>
-      </p:sp>
       <p:pic>
         <p:nvPicPr>
-          <p:cNvPr id="7" name="Picture 6"/>
+          <p:cNvPr id="5" name="Picture 4"/>
           <p:cNvPicPr>
             <a:picLocks noChangeAspect="1"/>
           </p:cNvPicPr>
@@ -3955,18 +3631,63 @@
         </p:blipFill>
         <p:spPr>
           <a:xfrm>
-            <a:off x="1269784" y="2318028"/>
-            <a:ext cx="4467225" cy="3543300"/>
+            <a:off x="608861" y="2261937"/>
+            <a:ext cx="4143632" cy="3850105"/>
           </a:xfrm>
           <a:prstGeom prst="rect">
             <a:avLst/>
           </a:prstGeom>
         </p:spPr>
       </p:pic>
+      <p:sp>
+        <p:nvSpPr>
+          <p:cNvPr id="6" name="Rectangle 5"/>
+          <p:cNvSpPr/>
+          <p:nvPr/>
+        </p:nvSpPr>
+        <p:spPr>
+          <a:xfrm>
+            <a:off x="0" y="6488668"/>
+            <a:ext cx="4259628" cy="369332"/>
+          </a:xfrm>
+          <a:prstGeom prst="rect">
+            <a:avLst/>
+          </a:prstGeom>
+        </p:spPr>
+        <p:txBody>
+          <a:bodyPr wrap="none">
+            <a:spAutoFit/>
+          </a:bodyPr>
+          <a:lstStyle/>
+          <a:p>
+            <a:r>
+              <a:rPr lang="en-US" dirty="0" err="1" smtClean="0"/>
+              <a:t>Tref</a:t>
+            </a:r>
+            <a:r>
+              <a:rPr lang="en-US" dirty="0" smtClean="0"/>
+              <a:t>, </a:t>
+            </a:r>
+            <a:r>
+              <a:rPr lang="en-US" dirty="0" err="1" smtClean="0"/>
+              <a:t>minAngle</a:t>
+            </a:r>
+            <a:r>
+              <a:rPr lang="en-US" dirty="0" smtClean="0"/>
+              <a:t> =0.1, Normal = [0.2</a:t>
+            </a:r>
+            <a:r>
+              <a:rPr lang="en-US" dirty="0" smtClean="0"/>
+              <a:t>, 0.0, 0.8]</a:t>
+            </a:r>
+            <a:endParaRPr lang="en-US" dirty="0"/>
+          </a:p>
+        </p:txBody>
+      </p:sp>
     </p:spTree>
     <p:extLst>
       <p:ext uri="{BB962C8B-B14F-4D97-AF65-F5344CB8AC3E}">
-        <p14:creationId xmlns:p14="http://schemas.microsoft.com/office/powerpoint/2010/main" val="3357732664"/>
+        <p14:creationId xmlns:p14="http://schemas.microsoft.com/office/powerpoint/2010/main" val="621269907"/>
       </p:ext>
     </p:extLst>
   </p:cSld>
@@ -4021,13 +3742,11 @@
       </p:sp>
       <p:pic>
         <p:nvPicPr>
-          <p:cNvPr id="4" name="Content Placeholder 3"/>
+          <p:cNvPr id="4" name="Picture 3"/>
           <p:cNvPicPr>
-            <a:picLocks noGrp="1" noChangeAspect="1"/>
+            <a:picLocks noChangeAspect="1"/>
           </p:cNvPicPr>
-          <p:nvPr>
-            <p:ph idx="1"/>
-          </p:nvPr>
+          <p:nvPr/>
         </p:nvPicPr>
         <p:blipFill>
           <a:blip r:embed="rId2"/>
@@ -4037,8 +3756,8 @@
         </p:blipFill>
         <p:spPr>
           <a:xfrm>
-            <a:off x="5381625" y="2034131"/>
-            <a:ext cx="5972175" cy="4191000"/>
+            <a:off x="1650081" y="2165185"/>
+            <a:ext cx="3991932" cy="3441783"/>
           </a:xfrm>
           <a:prstGeom prst="rect">
             <a:avLst/>
@@ -4060,9 +3779,9 @@
           </a:stretch>
         </p:blipFill>
         <p:spPr>
-          <a:xfrm>
-            <a:off x="608861" y="2261937"/>
-            <a:ext cx="4143632" cy="3850105"/>
+          <a:xfrm rot="5400000">
+            <a:off x="6309436" y="2085099"/>
+            <a:ext cx="4011777" cy="4171950"/>
           </a:xfrm>
           <a:prstGeom prst="rect">
             <a:avLst/>
@@ -4078,7 +3797,7 @@
         <p:spPr>
           <a:xfrm>
             <a:off x="0" y="6488668"/>
-            <a:ext cx="1422184" cy="369332"/>
+            <a:ext cx="4587153" cy="369332"/>
           </a:xfrm>
           <a:prstGeom prst="rect">
             <a:avLst/>
@@ -4092,7 +3811,137 @@
           <a:p>
             <a:r>
               <a:rPr lang="en-US" dirty="0" smtClean="0"/>
-              <a:t>[0.2, 0.0, 0.8]</a:t>
+              <a:t>Castle, </a:t>
+            </a:r>
+            <a:r>
+              <a:rPr lang="en-US" dirty="0" err="1"/>
+              <a:t>minAngle</a:t>
+            </a:r>
+            <a:r>
+              <a:rPr lang="en-US" dirty="0"/>
+              <a:t> = </a:t>
+            </a:r>
+            <a:r>
+              <a:rPr lang="en-US" dirty="0" smtClean="0"/>
+              <a:t>0.1, </a:t>
+            </a:r>
+            <a:r>
+              <a:rPr lang="en-US" dirty="0" smtClean="0"/>
+              <a:t>Normal = [0.2</a:t>
+            </a:r>
+            <a:r>
+              <a:rPr lang="en-US" dirty="0" smtClean="0"/>
+              <a:t>, 0.0, 0.8</a:t>
+            </a:r>
+            <a:r>
+              <a:rPr lang="en-US" dirty="0" smtClean="0"/>
+              <a:t>] </a:t>
+            </a:r>
+            <a:endParaRPr lang="en-US" dirty="0"/>
+          </a:p>
+        </p:txBody>
+      </p:sp>
+      <p:sp>
+        <p:nvSpPr>
+          <p:cNvPr id="7" name="Oval 6"/>
+          <p:cNvSpPr/>
+          <p:nvPr/>
+        </p:nvSpPr>
+        <p:spPr>
+          <a:xfrm>
+            <a:off x="7603958" y="3092116"/>
+            <a:ext cx="589547" cy="457200"/>
+          </a:xfrm>
+          <a:prstGeom prst="ellipse">
+            <a:avLst/>
+          </a:prstGeom>
+          <a:noFill/>
+        </p:spPr>
+        <p:style>
+          <a:lnRef idx="2">
+            <a:schemeClr val="accent1">
+              <a:shade val="50000"/>
+            </a:schemeClr>
+          </a:lnRef>
+          <a:fillRef idx="1">
+            <a:schemeClr val="accent1"/>
+          </a:fillRef>
+          <a:effectRef idx="0">
+            <a:schemeClr val="accent1"/>
+          </a:effectRef>
+          <a:fontRef idx="minor">
+            <a:schemeClr val="lt1"/>
+          </a:fontRef>
+        </p:style>
+        <p:txBody>
+          <a:bodyPr rtlCol="0" anchor="ctr"/>
+          <a:lstStyle/>
+          <a:p>
+            <a:pPr algn="ctr"/>
+            <a:endParaRPr lang="en-US"/>
+          </a:p>
+        </p:txBody>
+      </p:sp>
+      <p:cxnSp>
+        <p:nvCxnSpPr>
+          <p:cNvPr id="9" name="Straight Arrow Connector 8"/>
+          <p:cNvCxnSpPr>
+            <a:endCxn id="7" idx="0"/>
+          </p:cNvCxnSpPr>
+          <p:nvPr/>
+        </p:nvCxnSpPr>
+        <p:spPr>
+          <a:xfrm>
+            <a:off x="7483642" y="1900989"/>
+            <a:ext cx="415090" cy="1191127"/>
+          </a:xfrm>
+          <a:prstGeom prst="straightConnector1">
+            <a:avLst/>
+          </a:prstGeom>
+          <a:ln>
+            <a:tailEnd type="triangle"/>
+          </a:ln>
+        </p:spPr>
+        <p:style>
+          <a:lnRef idx="1">
+            <a:schemeClr val="accent1"/>
+          </a:lnRef>
+          <a:fillRef idx="0">
+            <a:schemeClr val="accent1"/>
+          </a:fillRef>
+          <a:effectRef idx="0">
+            <a:schemeClr val="accent1"/>
+          </a:effectRef>
+          <a:fontRef idx="minor">
+            <a:schemeClr val="tx1"/>
+          </a:fontRef>
+        </p:style>
+      </p:cxnSp>
+      <p:sp>
+        <p:nvSpPr>
+          <p:cNvPr id="12" name="TextBox 11"/>
+          <p:cNvSpPr txBox="1"/>
+          <p:nvPr/>
+        </p:nvSpPr>
+        <p:spPr>
+          <a:xfrm>
+            <a:off x="7146758" y="1600200"/>
+            <a:ext cx="741229" cy="369332"/>
+          </a:xfrm>
+          <a:prstGeom prst="rect">
+            <a:avLst/>
+          </a:prstGeom>
+          <a:noFill/>
+        </p:spPr>
+        <p:txBody>
+          <a:bodyPr wrap="none" rtlCol="0">
+            <a:spAutoFit/>
+          </a:bodyPr>
+          <a:lstStyle/>
+          <a:p>
+            <a:r>
+              <a:rPr lang="en-US" dirty="0" smtClean="0"/>
+              <a:t>Errors</a:t>
             </a:r>
             <a:endParaRPr lang="en-US" dirty="0"/>
           </a:p>
@@ -4101,20 +3950,13 @@
     </p:spTree>
     <p:extLst>
       <p:ext uri="{BB962C8B-B14F-4D97-AF65-F5344CB8AC3E}">
-        <p14:creationId xmlns:p14="http://schemas.microsoft.com/office/powerpoint/2010/main" val="621269907"/>
+        <p14:creationId xmlns:p14="http://schemas.microsoft.com/office/powerpoint/2010/main" val="3469714734"/>
       </p:ext>
     </p:extLst>
   </p:cSld>
   <p:clrMapOvr>
     <a:masterClrMapping/>
   </p:clrMapOvr>
-  <p:timing>
-    <p:tnLst>
-      <p:par>
-        <p:cTn id="1" dur="indefinite" restart="never" nodeType="tmRoot"/>
-      </p:par>
-    </p:tnLst>
-  </p:timing>
 </p:sld>
 </file>
 

</xml_diff>

<commit_message>
Removed SilhouetteDebugger and cleaned up Silhouette.
</commit_message>
<xml_diff>
--- a/TVGLTest/Silhouette Tests/Silhouette Tests.pptx
+++ b/TVGLTest/Silhouette Tests/Silhouette Tests.pptx
@@ -11,9 +11,10 @@
     <p:sldId id="261" r:id="rId5"/>
     <p:sldId id="262" r:id="rId6"/>
     <p:sldId id="266" r:id="rId7"/>
-    <p:sldId id="259" r:id="rId8"/>
-    <p:sldId id="263" r:id="rId9"/>
-    <p:sldId id="264" r:id="rId10"/>
+    <p:sldId id="267" r:id="rId8"/>
+    <p:sldId id="259" r:id="rId9"/>
+    <p:sldId id="263" r:id="rId10"/>
+    <p:sldId id="264" r:id="rId11"/>
   </p:sldIdLst>
   <p:sldSz cx="12192000" cy="6858000"/>
   <p:notesSz cx="6858000" cy="9144000"/>
@@ -251,7 +252,7 @@
           <a:p>
             <a:fld id="{4DEBB705-B24A-4D5B-A57C-42EB2ECBFFFC}" type="datetimeFigureOut">
               <a:rPr lang="en-US" smtClean="0"/>
-              <a:t>6/2/2018</a:t>
+              <a:t>6/4/2018</a:t>
             </a:fld>
             <a:endParaRPr lang="en-US"/>
           </a:p>
@@ -421,7 +422,7 @@
           <a:p>
             <a:fld id="{4DEBB705-B24A-4D5B-A57C-42EB2ECBFFFC}" type="datetimeFigureOut">
               <a:rPr lang="en-US" smtClean="0"/>
-              <a:t>6/2/2018</a:t>
+              <a:t>6/4/2018</a:t>
             </a:fld>
             <a:endParaRPr lang="en-US"/>
           </a:p>
@@ -601,7 +602,7 @@
           <a:p>
             <a:fld id="{4DEBB705-B24A-4D5B-A57C-42EB2ECBFFFC}" type="datetimeFigureOut">
               <a:rPr lang="en-US" smtClean="0"/>
-              <a:t>6/2/2018</a:t>
+              <a:t>6/4/2018</a:t>
             </a:fld>
             <a:endParaRPr lang="en-US"/>
           </a:p>
@@ -771,7 +772,7 @@
           <a:p>
             <a:fld id="{4DEBB705-B24A-4D5B-A57C-42EB2ECBFFFC}" type="datetimeFigureOut">
               <a:rPr lang="en-US" smtClean="0"/>
-              <a:t>6/2/2018</a:t>
+              <a:t>6/4/2018</a:t>
             </a:fld>
             <a:endParaRPr lang="en-US"/>
           </a:p>
@@ -1017,7 +1018,7 @@
           <a:p>
             <a:fld id="{4DEBB705-B24A-4D5B-A57C-42EB2ECBFFFC}" type="datetimeFigureOut">
               <a:rPr lang="en-US" smtClean="0"/>
-              <a:t>6/2/2018</a:t>
+              <a:t>6/4/2018</a:t>
             </a:fld>
             <a:endParaRPr lang="en-US"/>
           </a:p>
@@ -1249,7 +1250,7 @@
           <a:p>
             <a:fld id="{4DEBB705-B24A-4D5B-A57C-42EB2ECBFFFC}" type="datetimeFigureOut">
               <a:rPr lang="en-US" smtClean="0"/>
-              <a:t>6/2/2018</a:t>
+              <a:t>6/4/2018</a:t>
             </a:fld>
             <a:endParaRPr lang="en-US"/>
           </a:p>
@@ -1616,7 +1617,7 @@
           <a:p>
             <a:fld id="{4DEBB705-B24A-4D5B-A57C-42EB2ECBFFFC}" type="datetimeFigureOut">
               <a:rPr lang="en-US" smtClean="0"/>
-              <a:t>6/2/2018</a:t>
+              <a:t>6/4/2018</a:t>
             </a:fld>
             <a:endParaRPr lang="en-US"/>
           </a:p>
@@ -1734,7 +1735,7 @@
           <a:p>
             <a:fld id="{4DEBB705-B24A-4D5B-A57C-42EB2ECBFFFC}" type="datetimeFigureOut">
               <a:rPr lang="en-US" smtClean="0"/>
-              <a:t>6/2/2018</a:t>
+              <a:t>6/4/2018</a:t>
             </a:fld>
             <a:endParaRPr lang="en-US"/>
           </a:p>
@@ -1829,7 +1830,7 @@
           <a:p>
             <a:fld id="{4DEBB705-B24A-4D5B-A57C-42EB2ECBFFFC}" type="datetimeFigureOut">
               <a:rPr lang="en-US" smtClean="0"/>
-              <a:t>6/2/2018</a:t>
+              <a:t>6/4/2018</a:t>
             </a:fld>
             <a:endParaRPr lang="en-US"/>
           </a:p>
@@ -2106,7 +2107,7 @@
           <a:p>
             <a:fld id="{4DEBB705-B24A-4D5B-A57C-42EB2ECBFFFC}" type="datetimeFigureOut">
               <a:rPr lang="en-US" smtClean="0"/>
-              <a:t>6/2/2018</a:t>
+              <a:t>6/4/2018</a:t>
             </a:fld>
             <a:endParaRPr lang="en-US"/>
           </a:p>
@@ -2359,7 +2360,7 @@
           <a:p>
             <a:fld id="{4DEBB705-B24A-4D5B-A57C-42EB2ECBFFFC}" type="datetimeFigureOut">
               <a:rPr lang="en-US" smtClean="0"/>
-              <a:t>6/2/2018</a:t>
+              <a:t>6/4/2018</a:t>
             </a:fld>
             <a:endParaRPr lang="en-US"/>
           </a:p>
@@ -2572,7 +2573,7 @@
           <a:p>
             <a:fld id="{4DEBB705-B24A-4D5B-A57C-42EB2ECBFFFC}" type="datetimeFigureOut">
               <a:rPr lang="en-US" smtClean="0"/>
-              <a:t>6/2/2018</a:t>
+              <a:t>6/4/2018</a:t>
             </a:fld>
             <a:endParaRPr lang="en-US"/>
           </a:p>
@@ -3068,6 +3069,173 @@
 </p:sld>
 </file>
 
+<file path=ppt/slides/slide10.xml><?xml version="1.0" encoding="utf-8"?>
+<p:sld xmlns:a="http://schemas.openxmlformats.org/drawingml/2006/main" xmlns:r="http://schemas.openxmlformats.org/officeDocument/2006/relationships" xmlns:p="http://schemas.openxmlformats.org/presentationml/2006/main">
+  <p:cSld>
+    <p:spTree>
+      <p:nvGrpSpPr>
+        <p:cNvPr id="1" name=""/>
+        <p:cNvGrpSpPr/>
+        <p:nvPr/>
+      </p:nvGrpSpPr>
+      <p:grpSpPr>
+        <a:xfrm>
+          <a:off x="0" y="0"/>
+          <a:ext cx="0" cy="0"/>
+          <a:chOff x="0" y="0"/>
+          <a:chExt cx="0" cy="0"/>
+        </a:xfrm>
+      </p:grpSpPr>
+      <p:sp>
+        <p:nvSpPr>
+          <p:cNvPr id="2" name="Title 1"/>
+          <p:cNvSpPr>
+            <a:spLocks noGrp="1"/>
+          </p:cNvSpPr>
+          <p:nvPr>
+            <p:ph type="title"/>
+          </p:nvPr>
+        </p:nvSpPr>
+        <p:spPr/>
+        <p:txBody>
+          <a:bodyPr/>
+          <a:lstStyle/>
+          <a:p>
+            <a:endParaRPr lang="en-US" dirty="0"/>
+          </a:p>
+        </p:txBody>
+      </p:sp>
+      <p:pic>
+        <p:nvPicPr>
+          <p:cNvPr id="4" name="Content Placeholder 3"/>
+          <p:cNvPicPr>
+            <a:picLocks noGrp="1" noChangeAspect="1"/>
+          </p:cNvPicPr>
+          <p:nvPr>
+            <p:ph idx="1"/>
+          </p:nvPr>
+        </p:nvPicPr>
+        <p:blipFill>
+          <a:blip r:embed="rId2"/>
+          <a:stretch>
+            <a:fillRect/>
+          </a:stretch>
+        </p:blipFill>
+        <p:spPr>
+          <a:xfrm>
+            <a:off x="6030406" y="2372143"/>
+            <a:ext cx="5028368" cy="3522287"/>
+          </a:xfrm>
+          <a:prstGeom prst="rect">
+            <a:avLst/>
+          </a:prstGeom>
+        </p:spPr>
+      </p:pic>
+      <p:pic>
+        <p:nvPicPr>
+          <p:cNvPr id="5" name="Picture 4"/>
+          <p:cNvPicPr>
+            <a:picLocks noChangeAspect="1"/>
+          </p:cNvPicPr>
+          <p:nvPr/>
+        </p:nvPicPr>
+        <p:blipFill>
+          <a:blip r:embed="rId3"/>
+          <a:stretch>
+            <a:fillRect/>
+          </a:stretch>
+        </p:blipFill>
+        <p:spPr>
+          <a:xfrm>
+            <a:off x="210051" y="2372143"/>
+            <a:ext cx="5706978" cy="3370596"/>
+          </a:xfrm>
+          <a:prstGeom prst="rect">
+            <a:avLst/>
+          </a:prstGeom>
+        </p:spPr>
+      </p:pic>
+      <p:sp>
+        <p:nvSpPr>
+          <p:cNvPr id="6" name="Rectangle 5"/>
+          <p:cNvSpPr/>
+          <p:nvPr/>
+        </p:nvSpPr>
+        <p:spPr>
+          <a:xfrm>
+            <a:off x="0" y="6351824"/>
+            <a:ext cx="6136616" cy="369332"/>
+          </a:xfrm>
+          <a:prstGeom prst="rect">
+            <a:avLst/>
+          </a:prstGeom>
+        </p:spPr>
+        <p:txBody>
+          <a:bodyPr wrap="none">
+            <a:spAutoFit/>
+          </a:bodyPr>
+          <a:lstStyle/>
+          <a:p>
+            <a:r>
+              <a:rPr lang="en-US" dirty="0" err="1" smtClean="0">
+                <a:solidFill>
+                  <a:srgbClr val="000000"/>
+                </a:solidFill>
+                <a:latin typeface="Consolas" panose="020B0609020204030204" pitchFamily="49" charset="0"/>
+              </a:rPr>
+              <a:t>sth</a:t>
+            </a:r>
+            <a:r>
+              <a:rPr lang="en-US" dirty="0" smtClean="0">
+                <a:solidFill>
+                  <a:srgbClr val="000000"/>
+                </a:solidFill>
+                <a:latin typeface="Consolas" panose="020B0609020204030204" pitchFamily="49" charset="0"/>
+              </a:rPr>
+              <a:t>, </a:t>
+            </a:r>
+            <a:r>
+              <a:rPr lang="en-US" dirty="0" err="1" smtClean="0">
+                <a:solidFill>
+                  <a:srgbClr val="000000"/>
+                </a:solidFill>
+                <a:latin typeface="Consolas" panose="020B0609020204030204" pitchFamily="49" charset="0"/>
+              </a:rPr>
+              <a:t>MinAngle</a:t>
+            </a:r>
+            <a:r>
+              <a:rPr lang="en-US" dirty="0" smtClean="0">
+                <a:solidFill>
+                  <a:srgbClr val="000000"/>
+                </a:solidFill>
+                <a:latin typeface="Consolas" panose="020B0609020204030204" pitchFamily="49" charset="0"/>
+              </a:rPr>
+              <a:t> = 0.1, Normal = { 0.8, 0.1, 0.1 }</a:t>
+            </a:r>
+            <a:endParaRPr lang="en-US" dirty="0"/>
+          </a:p>
+        </p:txBody>
+      </p:sp>
+    </p:spTree>
+    <p:extLst>
+      <p:ext uri="{BB962C8B-B14F-4D97-AF65-F5344CB8AC3E}">
+        <p14:creationId xmlns:p14="http://schemas.microsoft.com/office/powerpoint/2010/main" val="3255674619"/>
+      </p:ext>
+    </p:extLst>
+  </p:cSld>
+  <p:clrMapOvr>
+    <a:masterClrMapping/>
+  </p:clrMapOvr>
+  <p:timing>
+    <p:tnLst>
+      <p:par>
+        <p:cTn id="1" dur="indefinite" restart="never" nodeType="tmRoot"/>
+      </p:par>
+    </p:tnLst>
+  </p:timing>
+</p:sld>
+</file>
+
 <file path=ppt/slides/slide2.xml><?xml version="1.0" encoding="utf-8"?>
 <p:sld xmlns:a="http://schemas.openxmlformats.org/drawingml/2006/main" xmlns:r="http://schemas.openxmlformats.org/officeDocument/2006/relationships" xmlns:p="http://schemas.openxmlformats.org/presentationml/2006/main">
   <p:cSld>
@@ -3170,19 +3338,7 @@
             </a:r>
             <a:r>
               <a:rPr lang="en-US" dirty="0" smtClean="0"/>
-              <a:t>0.1, </a:t>
-            </a:r>
-            <a:r>
-              <a:rPr lang="en-US" dirty="0" smtClean="0"/>
-              <a:t>Normal = [0.2</a:t>
-            </a:r>
-            <a:r>
-              <a:rPr lang="en-US" dirty="0" smtClean="0"/>
-              <a:t>, 0.0, 0.8</a:t>
-            </a:r>
-            <a:r>
-              <a:rPr lang="en-US" dirty="0" smtClean="0"/>
-              <a:t>] </a:t>
+              <a:t>0.1, Normal = [0.2, 0.0, 0.8] </a:t>
             </a:r>
             <a:endParaRPr lang="en-US" dirty="0"/>
           </a:p>
@@ -3341,11 +3497,7 @@
           <a:p>
             <a:r>
               <a:rPr lang="en-US" dirty="0" smtClean="0"/>
-              <a:t>Casing</a:t>
-            </a:r>
-            <a:r>
-              <a:rPr lang="en-US" dirty="0" smtClean="0"/>
-              <a:t>, </a:t>
+              <a:t>Casing, </a:t>
             </a:r>
             <a:r>
               <a:rPr lang="en-US" dirty="0" err="1" smtClean="0">
@@ -3674,11 +3826,7 @@
             </a:r>
             <a:r>
               <a:rPr lang="en-US" dirty="0" smtClean="0"/>
-              <a:t> =0.1, Normal = [0.2</a:t>
-            </a:r>
-            <a:r>
-              <a:rPr lang="en-US" dirty="0" smtClean="0"/>
-              <a:t>, 0.0, 0.8]</a:t>
+              <a:t> =0.1, Normal = [0.2, 0.0, 0.8]</a:t>
             </a:r>
             <a:endParaRPr lang="en-US" dirty="0"/>
           </a:p>
@@ -3764,9 +3912,50 @@
           </a:prstGeom>
         </p:spPr>
       </p:pic>
+      <p:sp>
+        <p:nvSpPr>
+          <p:cNvPr id="6" name="Rectangle 5"/>
+          <p:cNvSpPr/>
+          <p:nvPr/>
+        </p:nvSpPr>
+        <p:spPr>
+          <a:xfrm>
+            <a:off x="0" y="6488668"/>
+            <a:ext cx="4587153" cy="369332"/>
+          </a:xfrm>
+          <a:prstGeom prst="rect">
+            <a:avLst/>
+          </a:prstGeom>
+        </p:spPr>
+        <p:txBody>
+          <a:bodyPr wrap="none">
+            <a:spAutoFit/>
+          </a:bodyPr>
+          <a:lstStyle/>
+          <a:p>
+            <a:r>
+              <a:rPr lang="en-US" dirty="0" smtClean="0"/>
+              <a:t>Castle, </a:t>
+            </a:r>
+            <a:r>
+              <a:rPr lang="en-US" dirty="0" err="1"/>
+              <a:t>minAngle</a:t>
+            </a:r>
+            <a:r>
+              <a:rPr lang="en-US" dirty="0"/>
+              <a:t> = </a:t>
+            </a:r>
+            <a:r>
+              <a:rPr lang="en-US" dirty="0" smtClean="0"/>
+              <a:t>0.1, Normal = [0.2, 0.0, 0.8] </a:t>
+            </a:r>
+            <a:endParaRPr lang="en-US" dirty="0"/>
+          </a:p>
+        </p:txBody>
+      </p:sp>
       <p:pic>
         <p:nvPicPr>
-          <p:cNvPr id="5" name="Picture 4"/>
+          <p:cNvPr id="3" name="Picture 2"/>
           <p:cNvPicPr>
             <a:picLocks noChangeAspect="1"/>
           </p:cNvPicPr>
@@ -3780,173 +3969,14 @@
         </p:blipFill>
         <p:spPr>
           <a:xfrm rot="5400000">
-            <a:off x="6309436" y="2085099"/>
-            <a:ext cx="4011777" cy="4171950"/>
+            <a:off x="6627849" y="1735263"/>
+            <a:ext cx="3621763" cy="4121652"/>
           </a:xfrm>
           <a:prstGeom prst="rect">
             <a:avLst/>
           </a:prstGeom>
         </p:spPr>
       </p:pic>
-      <p:sp>
-        <p:nvSpPr>
-          <p:cNvPr id="6" name="Rectangle 5"/>
-          <p:cNvSpPr/>
-          <p:nvPr/>
-        </p:nvSpPr>
-        <p:spPr>
-          <a:xfrm>
-            <a:off x="0" y="6488668"/>
-            <a:ext cx="4587153" cy="369332"/>
-          </a:xfrm>
-          <a:prstGeom prst="rect">
-            <a:avLst/>
-          </a:prstGeom>
-        </p:spPr>
-        <p:txBody>
-          <a:bodyPr wrap="none">
-            <a:spAutoFit/>
-          </a:bodyPr>
-          <a:lstStyle/>
-          <a:p>
-            <a:r>
-              <a:rPr lang="en-US" dirty="0" smtClean="0"/>
-              <a:t>Castle, </a:t>
-            </a:r>
-            <a:r>
-              <a:rPr lang="en-US" dirty="0" err="1"/>
-              <a:t>minAngle</a:t>
-            </a:r>
-            <a:r>
-              <a:rPr lang="en-US" dirty="0"/>
-              <a:t> = </a:t>
-            </a:r>
-            <a:r>
-              <a:rPr lang="en-US" dirty="0" smtClean="0"/>
-              <a:t>0.1, </a:t>
-            </a:r>
-            <a:r>
-              <a:rPr lang="en-US" dirty="0" smtClean="0"/>
-              <a:t>Normal = [0.2</a:t>
-            </a:r>
-            <a:r>
-              <a:rPr lang="en-US" dirty="0" smtClean="0"/>
-              <a:t>, 0.0, 0.8</a:t>
-            </a:r>
-            <a:r>
-              <a:rPr lang="en-US" dirty="0" smtClean="0"/>
-              <a:t>] </a:t>
-            </a:r>
-            <a:endParaRPr lang="en-US" dirty="0"/>
-          </a:p>
-        </p:txBody>
-      </p:sp>
-      <p:sp>
-        <p:nvSpPr>
-          <p:cNvPr id="7" name="Oval 6"/>
-          <p:cNvSpPr/>
-          <p:nvPr/>
-        </p:nvSpPr>
-        <p:spPr>
-          <a:xfrm>
-            <a:off x="7603958" y="3092116"/>
-            <a:ext cx="589547" cy="457200"/>
-          </a:xfrm>
-          <a:prstGeom prst="ellipse">
-            <a:avLst/>
-          </a:prstGeom>
-          <a:noFill/>
-        </p:spPr>
-        <p:style>
-          <a:lnRef idx="2">
-            <a:schemeClr val="accent1">
-              <a:shade val="50000"/>
-            </a:schemeClr>
-          </a:lnRef>
-          <a:fillRef idx="1">
-            <a:schemeClr val="accent1"/>
-          </a:fillRef>
-          <a:effectRef idx="0">
-            <a:schemeClr val="accent1"/>
-          </a:effectRef>
-          <a:fontRef idx="minor">
-            <a:schemeClr val="lt1"/>
-          </a:fontRef>
-        </p:style>
-        <p:txBody>
-          <a:bodyPr rtlCol="0" anchor="ctr"/>
-          <a:lstStyle/>
-          <a:p>
-            <a:pPr algn="ctr"/>
-            <a:endParaRPr lang="en-US"/>
-          </a:p>
-        </p:txBody>
-      </p:sp>
-      <p:cxnSp>
-        <p:nvCxnSpPr>
-          <p:cNvPr id="9" name="Straight Arrow Connector 8"/>
-          <p:cNvCxnSpPr>
-            <a:endCxn id="7" idx="0"/>
-          </p:cNvCxnSpPr>
-          <p:nvPr/>
-        </p:nvCxnSpPr>
-        <p:spPr>
-          <a:xfrm>
-            <a:off x="7483642" y="1900989"/>
-            <a:ext cx="415090" cy="1191127"/>
-          </a:xfrm>
-          <a:prstGeom prst="straightConnector1">
-            <a:avLst/>
-          </a:prstGeom>
-          <a:ln>
-            <a:tailEnd type="triangle"/>
-          </a:ln>
-        </p:spPr>
-        <p:style>
-          <a:lnRef idx="1">
-            <a:schemeClr val="accent1"/>
-          </a:lnRef>
-          <a:fillRef idx="0">
-            <a:schemeClr val="accent1"/>
-          </a:fillRef>
-          <a:effectRef idx="0">
-            <a:schemeClr val="accent1"/>
-          </a:effectRef>
-          <a:fontRef idx="minor">
-            <a:schemeClr val="tx1"/>
-          </a:fontRef>
-        </p:style>
-      </p:cxnSp>
-      <p:sp>
-        <p:nvSpPr>
-          <p:cNvPr id="12" name="TextBox 11"/>
-          <p:cNvSpPr txBox="1"/>
-          <p:nvPr/>
-        </p:nvSpPr>
-        <p:spPr>
-          <a:xfrm>
-            <a:off x="7146758" y="1600200"/>
-            <a:ext cx="741229" cy="369332"/>
-          </a:xfrm>
-          <a:prstGeom prst="rect">
-            <a:avLst/>
-          </a:prstGeom>
-          <a:noFill/>
-        </p:spPr>
-        <p:txBody>
-          <a:bodyPr wrap="none" rtlCol="0">
-            <a:spAutoFit/>
-          </a:bodyPr>
-          <a:lstStyle/>
-          <a:p>
-            <a:r>
-              <a:rPr lang="en-US" dirty="0" smtClean="0"/>
-              <a:t>Errors</a:t>
-            </a:r>
-            <a:endParaRPr lang="en-US" dirty="0"/>
-          </a:p>
-        </p:txBody>
-      </p:sp>
     </p:spTree>
     <p:extLst>
       <p:ext uri="{BB962C8B-B14F-4D97-AF65-F5344CB8AC3E}">
@@ -3957,6 +3987,13 @@
   <p:clrMapOvr>
     <a:masterClrMapping/>
   </p:clrMapOvr>
+  <p:timing>
+    <p:tnLst>
+      <p:par>
+        <p:cTn id="1" dur="indefinite" restart="never" nodeType="tmRoot"/>
+      </p:par>
+    </p:tnLst>
+  </p:timing>
 </p:sld>
 </file>
 
@@ -3979,12 +4016,12 @@
       </p:grpSpPr>
       <p:sp>
         <p:nvSpPr>
-          <p:cNvPr id="3" name="Content Placeholder 2"/>
-          <p:cNvSpPr>
-            <a:spLocks noGrp="1"/>
-          </p:cNvSpPr>
-          <p:nvPr>
-            <p:ph idx="1"/>
+          <p:cNvPr id="2" name="Title 1"/>
+          <p:cNvSpPr>
+            <a:spLocks noGrp="1"/>
+          </p:cNvSpPr>
+          <p:nvPr>
+            <p:ph type="title"/>
           </p:nvPr>
         </p:nvSpPr>
         <p:spPr/>
@@ -3998,7 +4035,7 @@
       </p:sp>
       <p:pic>
         <p:nvPicPr>
-          <p:cNvPr id="4" name="Picture 3"/>
+          <p:cNvPr id="5" name="Picture 4"/>
           <p:cNvPicPr>
             <a:picLocks noChangeAspect="1"/>
           </p:cNvPicPr>
@@ -4012,17 +4049,36 @@
         </p:blipFill>
         <p:spPr>
           <a:xfrm>
-            <a:off x="568493" y="1904267"/>
-            <a:ext cx="5768139" cy="4272696"/>
+            <a:off x="360948" y="2711115"/>
+            <a:ext cx="4813099" cy="3408947"/>
           </a:xfrm>
           <a:prstGeom prst="rect">
             <a:avLst/>
           </a:prstGeom>
         </p:spPr>
       </p:pic>
+      <p:sp>
+        <p:nvSpPr>
+          <p:cNvPr id="6" name="Content Placeholder 5"/>
+          <p:cNvSpPr>
+            <a:spLocks noGrp="1"/>
+          </p:cNvSpPr>
+          <p:nvPr>
+            <p:ph idx="1"/>
+          </p:nvPr>
+        </p:nvSpPr>
+        <p:spPr/>
+        <p:txBody>
+          <a:bodyPr/>
+          <a:lstStyle/>
+          <a:p>
+            <a:endParaRPr lang="en-US"/>
+          </a:p>
+        </p:txBody>
+      </p:sp>
       <p:pic>
         <p:nvPicPr>
-          <p:cNvPr id="5" name="Picture 4"/>
+          <p:cNvPr id="7" name="Picture 6"/>
           <p:cNvPicPr>
             <a:picLocks noChangeAspect="1"/>
           </p:cNvPicPr>
@@ -4036,47 +4092,18 @@
         </p:blipFill>
         <p:spPr>
           <a:xfrm rot="5400000">
-            <a:off x="6599446" y="1697581"/>
-            <a:ext cx="4204786" cy="4191000"/>
+            <a:off x="5753281" y="2232040"/>
+            <a:ext cx="3521239" cy="4254807"/>
           </a:xfrm>
           <a:prstGeom prst="rect">
             <a:avLst/>
           </a:prstGeom>
         </p:spPr>
       </p:pic>
-      <p:sp>
-        <p:nvSpPr>
-          <p:cNvPr id="6" name="Rectangle 5"/>
-          <p:cNvSpPr/>
-          <p:nvPr/>
-        </p:nvSpPr>
-        <p:spPr>
-          <a:xfrm>
-            <a:off x="0" y="6424499"/>
-            <a:ext cx="1422184" cy="369332"/>
-          </a:xfrm>
-          <a:prstGeom prst="rect">
-            <a:avLst/>
-          </a:prstGeom>
-        </p:spPr>
-        <p:txBody>
-          <a:bodyPr wrap="none">
-            <a:spAutoFit/>
-          </a:bodyPr>
-          <a:lstStyle/>
-          <a:p>
-            <a:r>
-              <a:rPr lang="en-US" dirty="0" smtClean="0"/>
-              <a:t>[0.5, 0.0, 0.5]</a:t>
-            </a:r>
-            <a:endParaRPr lang="en-US" dirty="0"/>
-          </a:p>
-        </p:txBody>
-      </p:sp>
     </p:spTree>
     <p:extLst>
       <p:ext uri="{BB962C8B-B14F-4D97-AF65-F5344CB8AC3E}">
-        <p14:creationId xmlns:p14="http://schemas.microsoft.com/office/powerpoint/2010/main" val="3560535542"/>
+        <p14:creationId xmlns:p14="http://schemas.microsoft.com/office/powerpoint/2010/main" val="3588925764"/>
       </p:ext>
     </p:extLst>
   </p:cSld>
@@ -4112,59 +4139,26 @@
       </p:grpSpPr>
       <p:sp>
         <p:nvSpPr>
-          <p:cNvPr id="5" name="Rectangle 4"/>
-          <p:cNvSpPr/>
-          <p:nvPr/>
-        </p:nvSpPr>
-        <p:spPr>
-          <a:xfrm>
-            <a:off x="0" y="6351824"/>
-            <a:ext cx="7529625" cy="369332"/>
-          </a:xfrm>
-          <a:prstGeom prst="rect">
-            <a:avLst/>
-          </a:prstGeom>
-        </p:spPr>
-        <p:txBody>
-          <a:bodyPr wrap="none">
-            <a:spAutoFit/>
-          </a:bodyPr>
-          <a:lstStyle/>
-          <a:p>
-            <a:r>
-              <a:rPr lang="en-US" dirty="0" smtClean="0">
-                <a:solidFill>
-                  <a:srgbClr val="000000"/>
-                </a:solidFill>
-                <a:latin typeface="Consolas" panose="020B0609020204030204" pitchFamily="49" charset="0"/>
-              </a:rPr>
-              <a:t>Square Support, </a:t>
-            </a:r>
-            <a:r>
-              <a:rPr lang="en-US" dirty="0" err="1" smtClean="0">
-                <a:solidFill>
-                  <a:srgbClr val="000000"/>
-                </a:solidFill>
-                <a:latin typeface="Consolas" panose="020B0609020204030204" pitchFamily="49" charset="0"/>
-              </a:rPr>
-              <a:t>MinAngle</a:t>
-            </a:r>
-            <a:r>
-              <a:rPr lang="en-US" dirty="0" smtClean="0">
-                <a:solidFill>
-                  <a:srgbClr val="000000"/>
-                </a:solidFill>
-                <a:latin typeface="Consolas" panose="020B0609020204030204" pitchFamily="49" charset="0"/>
-              </a:rPr>
-              <a:t> = 0.1, Normal = { 0.8, 0.1, 0.1 }</a:t>
-            </a:r>
-            <a:endParaRPr lang="en-US" dirty="0"/>
+          <p:cNvPr id="3" name="Content Placeholder 2"/>
+          <p:cNvSpPr>
+            <a:spLocks noGrp="1"/>
+          </p:cNvSpPr>
+          <p:nvPr>
+            <p:ph idx="1"/>
+          </p:nvPr>
+        </p:nvSpPr>
+        <p:spPr/>
+        <p:txBody>
+          <a:bodyPr/>
+          <a:lstStyle/>
+          <a:p>
+            <a:endParaRPr lang="en-US"/>
           </a:p>
         </p:txBody>
       </p:sp>
       <p:pic>
         <p:nvPicPr>
-          <p:cNvPr id="10" name="Picture 9"/>
+          <p:cNvPr id="4" name="Picture 3"/>
           <p:cNvPicPr>
             <a:picLocks noChangeAspect="1"/>
           </p:cNvPicPr>
@@ -4178,8 +4172,8 @@
         </p:blipFill>
         <p:spPr>
           <a:xfrm>
-            <a:off x="5732795" y="807088"/>
-            <a:ext cx="5600951" cy="5432442"/>
+            <a:off x="568493" y="1904267"/>
+            <a:ext cx="5768139" cy="4272696"/>
           </a:xfrm>
           <a:prstGeom prst="rect">
             <a:avLst/>
@@ -4188,7 +4182,7 @@
       </p:pic>
       <p:pic>
         <p:nvPicPr>
-          <p:cNvPr id="12" name="Picture 11"/>
+          <p:cNvPr id="5" name="Picture 4"/>
           <p:cNvPicPr>
             <a:picLocks noChangeAspect="1"/>
           </p:cNvPicPr>
@@ -4201,19 +4195,48 @@
           </a:stretch>
         </p:blipFill>
         <p:spPr>
-          <a:xfrm>
-            <a:off x="575191" y="684596"/>
-            <a:ext cx="4999440" cy="5554934"/>
+          <a:xfrm rot="5400000">
+            <a:off x="6599446" y="1697581"/>
+            <a:ext cx="4204786" cy="4191000"/>
           </a:xfrm>
           <a:prstGeom prst="rect">
             <a:avLst/>
           </a:prstGeom>
         </p:spPr>
       </p:pic>
+      <p:sp>
+        <p:nvSpPr>
+          <p:cNvPr id="6" name="Rectangle 5"/>
+          <p:cNvSpPr/>
+          <p:nvPr/>
+        </p:nvSpPr>
+        <p:spPr>
+          <a:xfrm>
+            <a:off x="0" y="6424499"/>
+            <a:ext cx="1422184" cy="369332"/>
+          </a:xfrm>
+          <a:prstGeom prst="rect">
+            <a:avLst/>
+          </a:prstGeom>
+        </p:spPr>
+        <p:txBody>
+          <a:bodyPr wrap="none">
+            <a:spAutoFit/>
+          </a:bodyPr>
+          <a:lstStyle/>
+          <a:p>
+            <a:r>
+              <a:rPr lang="en-US" dirty="0" smtClean="0"/>
+              <a:t>[0.5, 0.0, 0.5]</a:t>
+            </a:r>
+            <a:endParaRPr lang="en-US" dirty="0"/>
+          </a:p>
+        </p:txBody>
+      </p:sp>
     </p:spTree>
     <p:extLst>
       <p:ext uri="{BB962C8B-B14F-4D97-AF65-F5344CB8AC3E}">
-        <p14:creationId xmlns:p14="http://schemas.microsoft.com/office/powerpoint/2010/main" val="1607937551"/>
+        <p14:creationId xmlns:p14="http://schemas.microsoft.com/office/powerpoint/2010/main" val="3560535542"/>
       </p:ext>
     </p:extLst>
   </p:cSld>
@@ -4249,32 +4272,63 @@
       </p:grpSpPr>
       <p:sp>
         <p:nvSpPr>
-          <p:cNvPr id="2" name="Title 1"/>
-          <p:cNvSpPr>
-            <a:spLocks noGrp="1"/>
-          </p:cNvSpPr>
-          <p:nvPr>
-            <p:ph type="title"/>
-          </p:nvPr>
-        </p:nvSpPr>
-        <p:spPr/>
-        <p:txBody>
-          <a:bodyPr/>
-          <a:lstStyle/>
-          <a:p>
+          <p:cNvPr id="5" name="Rectangle 4"/>
+          <p:cNvSpPr/>
+          <p:nvPr/>
+        </p:nvSpPr>
+        <p:spPr>
+          <a:xfrm>
+            <a:off x="0" y="6351824"/>
+            <a:ext cx="7529625" cy="369332"/>
+          </a:xfrm>
+          <a:prstGeom prst="rect">
+            <a:avLst/>
+          </a:prstGeom>
+        </p:spPr>
+        <p:txBody>
+          <a:bodyPr wrap="none">
+            <a:spAutoFit/>
+          </a:bodyPr>
+          <a:lstStyle/>
+          <a:p>
+            <a:r>
+              <a:rPr lang="en-US" dirty="0" smtClean="0">
+                <a:solidFill>
+                  <a:srgbClr val="000000"/>
+                </a:solidFill>
+                <a:latin typeface="Consolas" panose="020B0609020204030204" pitchFamily="49" charset="0"/>
+              </a:rPr>
+              <a:t>Square Support, </a:t>
+            </a:r>
+            <a:r>
+              <a:rPr lang="en-US" dirty="0" err="1" smtClean="0">
+                <a:solidFill>
+                  <a:srgbClr val="000000"/>
+                </a:solidFill>
+                <a:latin typeface="Consolas" panose="020B0609020204030204" pitchFamily="49" charset="0"/>
+              </a:rPr>
+              <a:t>MinAngle</a:t>
+            </a:r>
+            <a:r>
+              <a:rPr lang="en-US" dirty="0" smtClean="0">
+                <a:solidFill>
+                  <a:srgbClr val="000000"/>
+                </a:solidFill>
+                <a:latin typeface="Consolas" panose="020B0609020204030204" pitchFamily="49" charset="0"/>
+              </a:rPr>
+              <a:t> = 0.1, Normal = { 0.8, 0.1, 0.1 }</a:t>
+            </a:r>
             <a:endParaRPr lang="en-US" dirty="0"/>
           </a:p>
         </p:txBody>
       </p:sp>
       <p:pic>
         <p:nvPicPr>
-          <p:cNvPr id="4" name="Content Placeholder 3"/>
+          <p:cNvPr id="10" name="Picture 9"/>
           <p:cNvPicPr>
-            <a:picLocks noGrp="1" noChangeAspect="1"/>
+            <a:picLocks noChangeAspect="1"/>
           </p:cNvPicPr>
-          <p:nvPr>
-            <p:ph idx="1"/>
-          </p:nvPr>
+          <p:nvPr/>
         </p:nvPicPr>
         <p:blipFill>
           <a:blip r:embed="rId2"/>
@@ -4284,8 +4338,8 @@
         </p:blipFill>
         <p:spPr>
           <a:xfrm>
-            <a:off x="6030406" y="2372143"/>
-            <a:ext cx="5028368" cy="3522287"/>
+            <a:off x="5732796" y="2695074"/>
+            <a:ext cx="3654402" cy="3544456"/>
           </a:xfrm>
           <a:prstGeom prst="rect">
             <a:avLst/>
@@ -4294,7 +4348,7 @@
       </p:pic>
       <p:pic>
         <p:nvPicPr>
-          <p:cNvPr id="5" name="Picture 4"/>
+          <p:cNvPr id="12" name="Picture 11"/>
           <p:cNvPicPr>
             <a:picLocks noChangeAspect="1"/>
           </p:cNvPicPr>
@@ -4308,29 +4362,53 @@
         </p:blipFill>
         <p:spPr>
           <a:xfrm>
-            <a:off x="210051" y="2372143"/>
-            <a:ext cx="5706978" cy="3370596"/>
+            <a:off x="575191" y="684596"/>
+            <a:ext cx="4999440" cy="5554934"/>
           </a:xfrm>
           <a:prstGeom prst="rect">
             <a:avLst/>
           </a:prstGeom>
         </p:spPr>
       </p:pic>
-      <p:sp>
-        <p:nvSpPr>
-          <p:cNvPr id="6" name="Rectangle 5"/>
-          <p:cNvSpPr/>
+      <p:pic>
+        <p:nvPicPr>
+          <p:cNvPr id="2" name="Picture 1"/>
+          <p:cNvPicPr>
+            <a:picLocks noChangeAspect="1"/>
+          </p:cNvPicPr>
           <p:nvPr/>
-        </p:nvSpPr>
+        </p:nvPicPr>
+        <p:blipFill>
+          <a:blip r:embed="rId4"/>
+          <a:stretch>
+            <a:fillRect/>
+          </a:stretch>
+        </p:blipFill>
         <p:spPr>
           <a:xfrm>
-            <a:off x="0" y="6351824"/>
-            <a:ext cx="6136616" cy="369332"/>
+            <a:off x="9387198" y="521368"/>
+            <a:ext cx="2550194" cy="2531394"/>
           </a:xfrm>
           <a:prstGeom prst="rect">
             <a:avLst/>
           </a:prstGeom>
         </p:spPr>
+      </p:pic>
+      <p:sp>
+        <p:nvSpPr>
+          <p:cNvPr id="3" name="Rectangle 2"/>
+          <p:cNvSpPr/>
+          <p:nvPr/>
+        </p:nvSpPr>
+        <p:spPr>
+          <a:xfrm>
+            <a:off x="9179987" y="152036"/>
+            <a:ext cx="2844048" cy="369332"/>
+          </a:xfrm>
+          <a:prstGeom prst="rect">
+            <a:avLst/>
+          </a:prstGeom>
+        </p:spPr>
         <p:txBody>
           <a:bodyPr wrap="none">
             <a:spAutoFit/>
@@ -4338,13 +4416,13 @@
           <a:lstStyle/>
           <a:p>
             <a:r>
-              <a:rPr lang="en-US" dirty="0" err="1" smtClean="0">
+              <a:rPr lang="en-US" dirty="0">
                 <a:solidFill>
                   <a:srgbClr val="000000"/>
                 </a:solidFill>
                 <a:latin typeface="Consolas" panose="020B0609020204030204" pitchFamily="49" charset="0"/>
               </a:rPr>
-              <a:t>sth</a:t>
+              <a:t>Normal = { </a:t>
             </a:r>
             <a:r>
               <a:rPr lang="en-US" dirty="0" smtClean="0">
@@ -4353,25 +4431,37 @@
                 </a:solidFill>
                 <a:latin typeface="Consolas" panose="020B0609020204030204" pitchFamily="49" charset="0"/>
               </a:rPr>
-              <a:t>, </a:t>
-            </a:r>
-            <a:r>
-              <a:rPr lang="en-US" dirty="0" err="1" smtClean="0">
-                <a:solidFill>
-                  <a:srgbClr val="000000"/>
-                </a:solidFill>
-                <a:latin typeface="Consolas" panose="020B0609020204030204" pitchFamily="49" charset="0"/>
-              </a:rPr>
-              <a:t>MinAngle</a:t>
-            </a:r>
-            <a:r>
-              <a:rPr lang="en-US" dirty="0" smtClean="0">
-                <a:solidFill>
-                  <a:srgbClr val="000000"/>
-                </a:solidFill>
-                <a:latin typeface="Consolas" panose="020B0609020204030204" pitchFamily="49" charset="0"/>
-              </a:rPr>
-              <a:t> = 0.1, Normal = { 0.8, 0.1, 0.1 }</a:t>
+              <a:t>1.0, 0, 0}</a:t>
+            </a:r>
+            <a:endParaRPr lang="en-US" dirty="0"/>
+          </a:p>
+        </p:txBody>
+      </p:sp>
+      <p:sp>
+        <p:nvSpPr>
+          <p:cNvPr id="4" name="TextBox 3"/>
+          <p:cNvSpPr txBox="1"/>
+          <p:nvPr/>
+        </p:nvSpPr>
+        <p:spPr>
+          <a:xfrm>
+            <a:off x="9588884" y="1349281"/>
+            <a:ext cx="2348508" cy="646331"/>
+          </a:xfrm>
+          <a:prstGeom prst="rect">
+            <a:avLst/>
+          </a:prstGeom>
+          <a:noFill/>
+        </p:spPr>
+        <p:txBody>
+          <a:bodyPr wrap="square" rtlCol="0">
+            <a:spAutoFit/>
+          </a:bodyPr>
+          <a:lstStyle/>
+          <a:p>
+            <a:r>
+              <a:rPr lang="en-US" dirty="0" smtClean="0"/>
+              <a:t>Perfectly overlapping holes example</a:t>
             </a:r>
             <a:endParaRPr lang="en-US" dirty="0"/>
           </a:p>
@@ -4380,7 +4470,7 @@
     </p:spTree>
     <p:extLst>
       <p:ext uri="{BB962C8B-B14F-4D97-AF65-F5344CB8AC3E}">
-        <p14:creationId xmlns:p14="http://schemas.microsoft.com/office/powerpoint/2010/main" val="3255674619"/>
+        <p14:creationId xmlns:p14="http://schemas.microsoft.com/office/powerpoint/2010/main" val="1607937551"/>
       </p:ext>
     </p:extLst>
   </p:cSld>

</xml_diff>